<commit_message>
add some notes to week 3 powerpoint
</commit_message>
<xml_diff>
--- a/Week03/MoreTags.pptx
+++ b/Week03/MoreTags.pptx
@@ -212,7 +212,7 @@
           <a:p>
             <a:fld id="{60C6A8C3-8392-4BC1-B99F-0D6991348B0F}" type="datetimeFigureOut">
               <a:rPr lang="en-US" smtClean="0"/>
-              <a:t>10/7/2019</a:t>
+              <a:t>2/20/2020</a:t>
             </a:fld>
             <a:endParaRPr lang="en-US"/>
           </a:p>
@@ -1364,7 +1364,134 @@
           <a:bodyPr/>
           <a:lstStyle/>
           <a:p>
-            <a:endParaRPr lang="en-US" dirty="0"/>
+            <a:r>
+              <a:rPr lang="en-US" dirty="0" smtClean="0"/>
+              <a:t>Explain nesting as a concept using geography.</a:t>
+            </a:r>
+          </a:p>
+          <a:p>
+            <a:endParaRPr lang="en-US" dirty="0" smtClean="0"/>
+          </a:p>
+          <a:p>
+            <a:r>
+              <a:rPr lang="en-US" dirty="0" smtClean="0"/>
+              <a:t>Start</a:t>
+            </a:r>
+            <a:r>
+              <a:rPr lang="en-US" baseline="0" dirty="0" smtClean="0"/>
+              <a:t> by writing the following on the whiteboard (leave a lot of space around the tags):</a:t>
+            </a:r>
+          </a:p>
+          <a:p>
+            <a:endParaRPr lang="en-US" baseline="0" dirty="0" smtClean="0"/>
+          </a:p>
+          <a:p>
+            <a:r>
+              <a:rPr lang="en-US" b="1" baseline="0" dirty="0" smtClean="0"/>
+              <a:t>&lt;county name=“Cuyahoga”&gt;</a:t>
+            </a:r>
+          </a:p>
+          <a:p>
+            <a:endParaRPr lang="en-US" b="1" baseline="0" dirty="0" smtClean="0"/>
+          </a:p>
+          <a:p>
+            <a:r>
+              <a:rPr lang="en-US" b="1" baseline="0" dirty="0" smtClean="0"/>
+              <a:t>&lt;/county&gt;</a:t>
+            </a:r>
+          </a:p>
+          <a:p>
+            <a:endParaRPr lang="en-US" baseline="0" dirty="0" smtClean="0"/>
+          </a:p>
+          <a:p>
+            <a:r>
+              <a:rPr lang="en-US" b="0" baseline="0" dirty="0" smtClean="0"/>
+              <a:t>Ask what goes within a county – a city! Add that to the code:</a:t>
+            </a:r>
+          </a:p>
+          <a:p>
+            <a:endParaRPr lang="en-US" b="0" baseline="0" dirty="0" smtClean="0"/>
+          </a:p>
+          <a:p>
+            <a:r>
+              <a:rPr lang="en-US" b="1" baseline="0" dirty="0" smtClean="0"/>
+              <a:t>&lt;county name=“Cuyahoga”&gt;</a:t>
+            </a:r>
+          </a:p>
+          <a:p>
+            <a:r>
+              <a:rPr lang="en-US" b="1" baseline="0" dirty="0" smtClean="0"/>
+              <a:t>    &lt;city name=“Westlake”&gt;&lt;/city&gt;</a:t>
+            </a:r>
+          </a:p>
+          <a:p>
+            <a:r>
+              <a:rPr lang="en-US" b="1" baseline="0" dirty="0" smtClean="0"/>
+              <a:t>&lt;/county&gt;</a:t>
+            </a:r>
+          </a:p>
+          <a:p>
+            <a:endParaRPr lang="en-US" b="1" baseline="0" dirty="0" smtClean="0"/>
+          </a:p>
+          <a:p>
+            <a:r>
+              <a:rPr lang="en-US" b="0" baseline="0" dirty="0" smtClean="0"/>
+              <a:t>Ask what goes around a county – a state! Add that to the code:</a:t>
+            </a:r>
+          </a:p>
+          <a:p>
+            <a:endParaRPr lang="en-US" b="0" baseline="0" dirty="0" smtClean="0"/>
+          </a:p>
+          <a:p>
+            <a:r>
+              <a:rPr lang="en-US" b="1" baseline="0" dirty="0" smtClean="0"/>
+              <a:t>&lt;state name=“Ohio”&gt;</a:t>
+            </a:r>
+          </a:p>
+          <a:p>
+            <a:r>
+              <a:rPr lang="en-US" b="1" baseline="0" dirty="0" smtClean="0"/>
+              <a:t>    &lt;county name=“Cuyahoga”&gt;</a:t>
+            </a:r>
+          </a:p>
+          <a:p>
+            <a:r>
+              <a:rPr lang="en-US" b="1" baseline="0" dirty="0" smtClean="0"/>
+              <a:t>        &lt;city name=“Westlake”&gt;&lt;/city&gt;</a:t>
+            </a:r>
+          </a:p>
+          <a:p>
+            <a:r>
+              <a:rPr lang="en-US" b="1" baseline="0" dirty="0" smtClean="0"/>
+              <a:t>    &lt;/county&gt;</a:t>
+            </a:r>
+          </a:p>
+          <a:p>
+            <a:r>
+              <a:rPr lang="en-US" b="1" baseline="0" dirty="0" smtClean="0"/>
+              <a:t>&lt;/state&gt;</a:t>
+            </a:r>
+            <a:endParaRPr lang="en-US" b="0" baseline="0" dirty="0" smtClean="0"/>
+          </a:p>
+          <a:p>
+            <a:endParaRPr lang="en-US" b="0" baseline="0" dirty="0" smtClean="0"/>
+          </a:p>
+          <a:p>
+            <a:r>
+              <a:rPr lang="en-US" b="0" baseline="0" dirty="0" smtClean="0"/>
+              <a:t>Use this concept to explain nesting. Explain parent/child relationships. The next slide has </a:t>
+            </a:r>
+            <a:r>
+              <a:rPr lang="en-US" b="0" baseline="0" smtClean="0"/>
+              <a:t>an example using lists.</a:t>
+            </a:r>
+            <a:endParaRPr lang="en-US" b="1" baseline="0" dirty="0" smtClean="0"/>
+          </a:p>
+          <a:p>
+            <a:endParaRPr lang="en-US" b="0" baseline="0" dirty="0" smtClean="0"/>
+          </a:p>
+          <a:p>
+            <a:endParaRPr lang="en-US" b="0" baseline="0" dirty="0" smtClean="0"/>
           </a:p>
         </p:txBody>
       </p:sp>
@@ -1745,7 +1872,7 @@
           <a:p>
             <a:fld id="{61FD5E12-641C-4696-BA65-B86205845F69}" type="datetimeFigureOut">
               <a:rPr lang="en-US" smtClean="0"/>
-              <a:t>10/7/2019</a:t>
+              <a:t>2/20/2020</a:t>
             </a:fld>
             <a:endParaRPr lang="en-US"/>
           </a:p>
@@ -1915,7 +2042,7 @@
           <a:p>
             <a:fld id="{61FD5E12-641C-4696-BA65-B86205845F69}" type="datetimeFigureOut">
               <a:rPr lang="en-US" smtClean="0"/>
-              <a:t>10/7/2019</a:t>
+              <a:t>2/20/2020</a:t>
             </a:fld>
             <a:endParaRPr lang="en-US"/>
           </a:p>
@@ -2095,7 +2222,7 @@
           <a:p>
             <a:fld id="{61FD5E12-641C-4696-BA65-B86205845F69}" type="datetimeFigureOut">
               <a:rPr lang="en-US" smtClean="0"/>
-              <a:t>10/7/2019</a:t>
+              <a:t>2/20/2020</a:t>
             </a:fld>
             <a:endParaRPr lang="en-US"/>
           </a:p>
@@ -3080,7 +3207,7 @@
           <a:p>
             <a:fld id="{61FD5E12-641C-4696-BA65-B86205845F69}" type="datetimeFigureOut">
               <a:rPr lang="en-US" smtClean="0"/>
-              <a:t>10/7/2019</a:t>
+              <a:t>2/20/2020</a:t>
             </a:fld>
             <a:endParaRPr lang="en-US"/>
           </a:p>
@@ -3326,7 +3453,7 @@
           <a:p>
             <a:fld id="{61FD5E12-641C-4696-BA65-B86205845F69}" type="datetimeFigureOut">
               <a:rPr lang="en-US" smtClean="0"/>
-              <a:t>10/7/2019</a:t>
+              <a:t>2/20/2020</a:t>
             </a:fld>
             <a:endParaRPr lang="en-US"/>
           </a:p>
@@ -3558,7 +3685,7 @@
           <a:p>
             <a:fld id="{61FD5E12-641C-4696-BA65-B86205845F69}" type="datetimeFigureOut">
               <a:rPr lang="en-US" smtClean="0"/>
-              <a:t>10/7/2019</a:t>
+              <a:t>2/20/2020</a:t>
             </a:fld>
             <a:endParaRPr lang="en-US"/>
           </a:p>
@@ -3925,7 +4052,7 @@
           <a:p>
             <a:fld id="{61FD5E12-641C-4696-BA65-B86205845F69}" type="datetimeFigureOut">
               <a:rPr lang="en-US" smtClean="0"/>
-              <a:t>10/7/2019</a:t>
+              <a:t>2/20/2020</a:t>
             </a:fld>
             <a:endParaRPr lang="en-US"/>
           </a:p>
@@ -4043,7 +4170,7 @@
           <a:p>
             <a:fld id="{61FD5E12-641C-4696-BA65-B86205845F69}" type="datetimeFigureOut">
               <a:rPr lang="en-US" smtClean="0"/>
-              <a:t>10/7/2019</a:t>
+              <a:t>2/20/2020</a:t>
             </a:fld>
             <a:endParaRPr lang="en-US"/>
           </a:p>
@@ -4138,7 +4265,7 @@
           <a:p>
             <a:fld id="{61FD5E12-641C-4696-BA65-B86205845F69}" type="datetimeFigureOut">
               <a:rPr lang="en-US" smtClean="0"/>
-              <a:t>10/7/2019</a:t>
+              <a:t>2/20/2020</a:t>
             </a:fld>
             <a:endParaRPr lang="en-US"/>
           </a:p>
@@ -4415,7 +4542,7 @@
           <a:p>
             <a:fld id="{61FD5E12-641C-4696-BA65-B86205845F69}" type="datetimeFigureOut">
               <a:rPr lang="en-US" smtClean="0"/>
-              <a:t>10/7/2019</a:t>
+              <a:t>2/20/2020</a:t>
             </a:fld>
             <a:endParaRPr lang="en-US"/>
           </a:p>
@@ -4672,7 +4799,7 @@
           <a:p>
             <a:fld id="{61FD5E12-641C-4696-BA65-B86205845F69}" type="datetimeFigureOut">
               <a:rPr lang="en-US" smtClean="0"/>
-              <a:t>10/7/2019</a:t>
+              <a:t>2/20/2020</a:t>
             </a:fld>
             <a:endParaRPr lang="en-US"/>
           </a:p>
@@ -4885,7 +5012,7 @@
           <a:p>
             <a:fld id="{61FD5E12-641C-4696-BA65-B86205845F69}" type="datetimeFigureOut">
               <a:rPr lang="en-US" smtClean="0"/>
-              <a:t>10/7/2019</a:t>
+              <a:t>2/20/2020</a:t>
             </a:fld>
             <a:endParaRPr lang="en-US"/>
           </a:p>

</xml_diff>

<commit_message>
Deploy hytechclub/web-101 to github.com/hytechclub/web-101.git:gh-pages
</commit_message>
<xml_diff>
--- a/Week03/MoreTags.pptx
+++ b/Week03/MoreTags.pptx
@@ -212,7 +212,7 @@
           <a:p>
             <a:fld id="{60C6A8C3-8392-4BC1-B99F-0D6991348B0F}" type="datetimeFigureOut">
               <a:rPr lang="en-US" smtClean="0"/>
-              <a:t>10/7/2019</a:t>
+              <a:t>2/20/2020</a:t>
             </a:fld>
             <a:endParaRPr lang="en-US"/>
           </a:p>
@@ -1364,7 +1364,134 @@
           <a:bodyPr/>
           <a:lstStyle/>
           <a:p>
-            <a:endParaRPr lang="en-US" dirty="0"/>
+            <a:r>
+              <a:rPr lang="en-US" dirty="0" smtClean="0"/>
+              <a:t>Explain nesting as a concept using geography.</a:t>
+            </a:r>
+          </a:p>
+          <a:p>
+            <a:endParaRPr lang="en-US" dirty="0" smtClean="0"/>
+          </a:p>
+          <a:p>
+            <a:r>
+              <a:rPr lang="en-US" dirty="0" smtClean="0"/>
+              <a:t>Start</a:t>
+            </a:r>
+            <a:r>
+              <a:rPr lang="en-US" baseline="0" dirty="0" smtClean="0"/>
+              <a:t> by writing the following on the whiteboard (leave a lot of space around the tags):</a:t>
+            </a:r>
+          </a:p>
+          <a:p>
+            <a:endParaRPr lang="en-US" baseline="0" dirty="0" smtClean="0"/>
+          </a:p>
+          <a:p>
+            <a:r>
+              <a:rPr lang="en-US" b="1" baseline="0" dirty="0" smtClean="0"/>
+              <a:t>&lt;county name=“Cuyahoga”&gt;</a:t>
+            </a:r>
+          </a:p>
+          <a:p>
+            <a:endParaRPr lang="en-US" b="1" baseline="0" dirty="0" smtClean="0"/>
+          </a:p>
+          <a:p>
+            <a:r>
+              <a:rPr lang="en-US" b="1" baseline="0" dirty="0" smtClean="0"/>
+              <a:t>&lt;/county&gt;</a:t>
+            </a:r>
+          </a:p>
+          <a:p>
+            <a:endParaRPr lang="en-US" baseline="0" dirty="0" smtClean="0"/>
+          </a:p>
+          <a:p>
+            <a:r>
+              <a:rPr lang="en-US" b="0" baseline="0" dirty="0" smtClean="0"/>
+              <a:t>Ask what goes within a county – a city! Add that to the code:</a:t>
+            </a:r>
+          </a:p>
+          <a:p>
+            <a:endParaRPr lang="en-US" b="0" baseline="0" dirty="0" smtClean="0"/>
+          </a:p>
+          <a:p>
+            <a:r>
+              <a:rPr lang="en-US" b="1" baseline="0" dirty="0" smtClean="0"/>
+              <a:t>&lt;county name=“Cuyahoga”&gt;</a:t>
+            </a:r>
+          </a:p>
+          <a:p>
+            <a:r>
+              <a:rPr lang="en-US" b="1" baseline="0" dirty="0" smtClean="0"/>
+              <a:t>    &lt;city name=“Westlake”&gt;&lt;/city&gt;</a:t>
+            </a:r>
+          </a:p>
+          <a:p>
+            <a:r>
+              <a:rPr lang="en-US" b="1" baseline="0" dirty="0" smtClean="0"/>
+              <a:t>&lt;/county&gt;</a:t>
+            </a:r>
+          </a:p>
+          <a:p>
+            <a:endParaRPr lang="en-US" b="1" baseline="0" dirty="0" smtClean="0"/>
+          </a:p>
+          <a:p>
+            <a:r>
+              <a:rPr lang="en-US" b="0" baseline="0" dirty="0" smtClean="0"/>
+              <a:t>Ask what goes around a county – a state! Add that to the code:</a:t>
+            </a:r>
+          </a:p>
+          <a:p>
+            <a:endParaRPr lang="en-US" b="0" baseline="0" dirty="0" smtClean="0"/>
+          </a:p>
+          <a:p>
+            <a:r>
+              <a:rPr lang="en-US" b="1" baseline="0" dirty="0" smtClean="0"/>
+              <a:t>&lt;state name=“Ohio”&gt;</a:t>
+            </a:r>
+          </a:p>
+          <a:p>
+            <a:r>
+              <a:rPr lang="en-US" b="1" baseline="0" dirty="0" smtClean="0"/>
+              <a:t>    &lt;county name=“Cuyahoga”&gt;</a:t>
+            </a:r>
+          </a:p>
+          <a:p>
+            <a:r>
+              <a:rPr lang="en-US" b="1" baseline="0" dirty="0" smtClean="0"/>
+              <a:t>        &lt;city name=“Westlake”&gt;&lt;/city&gt;</a:t>
+            </a:r>
+          </a:p>
+          <a:p>
+            <a:r>
+              <a:rPr lang="en-US" b="1" baseline="0" dirty="0" smtClean="0"/>
+              <a:t>    &lt;/county&gt;</a:t>
+            </a:r>
+          </a:p>
+          <a:p>
+            <a:r>
+              <a:rPr lang="en-US" b="1" baseline="0" dirty="0" smtClean="0"/>
+              <a:t>&lt;/state&gt;</a:t>
+            </a:r>
+            <a:endParaRPr lang="en-US" b="0" baseline="0" dirty="0" smtClean="0"/>
+          </a:p>
+          <a:p>
+            <a:endParaRPr lang="en-US" b="0" baseline="0" dirty="0" smtClean="0"/>
+          </a:p>
+          <a:p>
+            <a:r>
+              <a:rPr lang="en-US" b="0" baseline="0" dirty="0" smtClean="0"/>
+              <a:t>Use this concept to explain nesting. Explain parent/child relationships. The next slide has </a:t>
+            </a:r>
+            <a:r>
+              <a:rPr lang="en-US" b="0" baseline="0" smtClean="0"/>
+              <a:t>an example using lists.</a:t>
+            </a:r>
+            <a:endParaRPr lang="en-US" b="1" baseline="0" dirty="0" smtClean="0"/>
+          </a:p>
+          <a:p>
+            <a:endParaRPr lang="en-US" b="0" baseline="0" dirty="0" smtClean="0"/>
+          </a:p>
+          <a:p>
+            <a:endParaRPr lang="en-US" b="0" baseline="0" dirty="0" smtClean="0"/>
           </a:p>
         </p:txBody>
       </p:sp>
@@ -1745,7 +1872,7 @@
           <a:p>
             <a:fld id="{61FD5E12-641C-4696-BA65-B86205845F69}" type="datetimeFigureOut">
               <a:rPr lang="en-US" smtClean="0"/>
-              <a:t>10/7/2019</a:t>
+              <a:t>2/20/2020</a:t>
             </a:fld>
             <a:endParaRPr lang="en-US"/>
           </a:p>
@@ -1915,7 +2042,7 @@
           <a:p>
             <a:fld id="{61FD5E12-641C-4696-BA65-B86205845F69}" type="datetimeFigureOut">
               <a:rPr lang="en-US" smtClean="0"/>
-              <a:t>10/7/2019</a:t>
+              <a:t>2/20/2020</a:t>
             </a:fld>
             <a:endParaRPr lang="en-US"/>
           </a:p>
@@ -2095,7 +2222,7 @@
           <a:p>
             <a:fld id="{61FD5E12-641C-4696-BA65-B86205845F69}" type="datetimeFigureOut">
               <a:rPr lang="en-US" smtClean="0"/>
-              <a:t>10/7/2019</a:t>
+              <a:t>2/20/2020</a:t>
             </a:fld>
             <a:endParaRPr lang="en-US"/>
           </a:p>
@@ -3080,7 +3207,7 @@
           <a:p>
             <a:fld id="{61FD5E12-641C-4696-BA65-B86205845F69}" type="datetimeFigureOut">
               <a:rPr lang="en-US" smtClean="0"/>
-              <a:t>10/7/2019</a:t>
+              <a:t>2/20/2020</a:t>
             </a:fld>
             <a:endParaRPr lang="en-US"/>
           </a:p>
@@ -3326,7 +3453,7 @@
           <a:p>
             <a:fld id="{61FD5E12-641C-4696-BA65-B86205845F69}" type="datetimeFigureOut">
               <a:rPr lang="en-US" smtClean="0"/>
-              <a:t>10/7/2019</a:t>
+              <a:t>2/20/2020</a:t>
             </a:fld>
             <a:endParaRPr lang="en-US"/>
           </a:p>
@@ -3558,7 +3685,7 @@
           <a:p>
             <a:fld id="{61FD5E12-641C-4696-BA65-B86205845F69}" type="datetimeFigureOut">
               <a:rPr lang="en-US" smtClean="0"/>
-              <a:t>10/7/2019</a:t>
+              <a:t>2/20/2020</a:t>
             </a:fld>
             <a:endParaRPr lang="en-US"/>
           </a:p>
@@ -3925,7 +4052,7 @@
           <a:p>
             <a:fld id="{61FD5E12-641C-4696-BA65-B86205845F69}" type="datetimeFigureOut">
               <a:rPr lang="en-US" smtClean="0"/>
-              <a:t>10/7/2019</a:t>
+              <a:t>2/20/2020</a:t>
             </a:fld>
             <a:endParaRPr lang="en-US"/>
           </a:p>
@@ -4043,7 +4170,7 @@
           <a:p>
             <a:fld id="{61FD5E12-641C-4696-BA65-B86205845F69}" type="datetimeFigureOut">
               <a:rPr lang="en-US" smtClean="0"/>
-              <a:t>10/7/2019</a:t>
+              <a:t>2/20/2020</a:t>
             </a:fld>
             <a:endParaRPr lang="en-US"/>
           </a:p>
@@ -4138,7 +4265,7 @@
           <a:p>
             <a:fld id="{61FD5E12-641C-4696-BA65-B86205845F69}" type="datetimeFigureOut">
               <a:rPr lang="en-US" smtClean="0"/>
-              <a:t>10/7/2019</a:t>
+              <a:t>2/20/2020</a:t>
             </a:fld>
             <a:endParaRPr lang="en-US"/>
           </a:p>
@@ -4415,7 +4542,7 @@
           <a:p>
             <a:fld id="{61FD5E12-641C-4696-BA65-B86205845F69}" type="datetimeFigureOut">
               <a:rPr lang="en-US" smtClean="0"/>
-              <a:t>10/7/2019</a:t>
+              <a:t>2/20/2020</a:t>
             </a:fld>
             <a:endParaRPr lang="en-US"/>
           </a:p>
@@ -4672,7 +4799,7 @@
           <a:p>
             <a:fld id="{61FD5E12-641C-4696-BA65-B86205845F69}" type="datetimeFigureOut">
               <a:rPr lang="en-US" smtClean="0"/>
-              <a:t>10/7/2019</a:t>
+              <a:t>2/20/2020</a:t>
             </a:fld>
             <a:endParaRPr lang="en-US"/>
           </a:p>
@@ -4885,7 +5012,7 @@
           <a:p>
             <a:fld id="{61FD5E12-641C-4696-BA65-B86205845F69}" type="datetimeFigureOut">
               <a:rPr lang="en-US" smtClean="0"/>
-              <a:t>10/7/2019</a:t>
+              <a:t>2/20/2020</a:t>
             </a:fld>
             <a:endParaRPr lang="en-US"/>
           </a:p>

</xml_diff>